<commit_message>
update raw4dom plan docs
</commit_message>
<xml_diff>
--- a/docs/_static/anime.pptx
+++ b/docs/_static/anime.pptx
@@ -7,6 +7,7 @@
   <p:sldIdLst>
     <p:sldId id="256" r:id="rId2"/>
     <p:sldId id="257" r:id="rId3"/>
+    <p:sldId id="258" r:id="rId4"/>
   </p:sldIdLst>
   <p:sldSz cx="12192000" cy="6858000"/>
   <p:notesSz cx="6858000" cy="9144000"/>
@@ -521,7 +522,7 @@
           <a:p>
             <a:fld id="{F22BDC89-9E9E-3E48-98D5-B035B26EE505}" type="datetimeFigureOut">
               <a:rPr kumimoji="1" lang="zh-CN" altLang="en-US" smtClean="0"/>
-              <a:t>2022/7/28</a:t>
+              <a:t>2022/12/6</a:t>
             </a:fld>
             <a:endParaRPr kumimoji="1" lang="zh-CN" altLang="en-US"/>
           </a:p>
@@ -719,7 +720,7 @@
           <a:p>
             <a:fld id="{F22BDC89-9E9E-3E48-98D5-B035B26EE505}" type="datetimeFigureOut">
               <a:rPr kumimoji="1" lang="zh-CN" altLang="en-US" smtClean="0"/>
-              <a:t>2022/7/28</a:t>
+              <a:t>2022/12/6</a:t>
             </a:fld>
             <a:endParaRPr kumimoji="1" lang="zh-CN" altLang="en-US"/>
           </a:p>
@@ -927,7 +928,7 @@
           <a:p>
             <a:fld id="{F22BDC89-9E9E-3E48-98D5-B035B26EE505}" type="datetimeFigureOut">
               <a:rPr kumimoji="1" lang="zh-CN" altLang="en-US" smtClean="0"/>
-              <a:t>2022/7/28</a:t>
+              <a:t>2022/12/6</a:t>
             </a:fld>
             <a:endParaRPr kumimoji="1" lang="zh-CN" altLang="en-US"/>
           </a:p>
@@ -1125,7 +1126,7 @@
           <a:p>
             <a:fld id="{F22BDC89-9E9E-3E48-98D5-B035B26EE505}" type="datetimeFigureOut">
               <a:rPr kumimoji="1" lang="zh-CN" altLang="en-US" smtClean="0"/>
-              <a:t>2022/7/28</a:t>
+              <a:t>2022/12/6</a:t>
             </a:fld>
             <a:endParaRPr kumimoji="1" lang="zh-CN" altLang="en-US"/>
           </a:p>
@@ -1400,7 +1401,7 @@
           <a:p>
             <a:fld id="{F22BDC89-9E9E-3E48-98D5-B035B26EE505}" type="datetimeFigureOut">
               <a:rPr kumimoji="1" lang="zh-CN" altLang="en-US" smtClean="0"/>
-              <a:t>2022/7/28</a:t>
+              <a:t>2022/12/6</a:t>
             </a:fld>
             <a:endParaRPr kumimoji="1" lang="zh-CN" altLang="en-US"/>
           </a:p>
@@ -1665,7 +1666,7 @@
           <a:p>
             <a:fld id="{F22BDC89-9E9E-3E48-98D5-B035B26EE505}" type="datetimeFigureOut">
               <a:rPr kumimoji="1" lang="zh-CN" altLang="en-US" smtClean="0"/>
-              <a:t>2022/7/28</a:t>
+              <a:t>2022/12/6</a:t>
             </a:fld>
             <a:endParaRPr kumimoji="1" lang="zh-CN" altLang="en-US"/>
           </a:p>
@@ -2077,7 +2078,7 @@
           <a:p>
             <a:fld id="{F22BDC89-9E9E-3E48-98D5-B035B26EE505}" type="datetimeFigureOut">
               <a:rPr kumimoji="1" lang="zh-CN" altLang="en-US" smtClean="0"/>
-              <a:t>2022/7/28</a:t>
+              <a:t>2022/12/6</a:t>
             </a:fld>
             <a:endParaRPr kumimoji="1" lang="zh-CN" altLang="en-US"/>
           </a:p>
@@ -2218,7 +2219,7 @@
           <a:p>
             <a:fld id="{F22BDC89-9E9E-3E48-98D5-B035B26EE505}" type="datetimeFigureOut">
               <a:rPr kumimoji="1" lang="zh-CN" altLang="en-US" smtClean="0"/>
-              <a:t>2022/7/28</a:t>
+              <a:t>2022/12/6</a:t>
             </a:fld>
             <a:endParaRPr kumimoji="1" lang="zh-CN" altLang="en-US"/>
           </a:p>
@@ -2331,7 +2332,7 @@
           <a:p>
             <a:fld id="{F22BDC89-9E9E-3E48-98D5-B035B26EE505}" type="datetimeFigureOut">
               <a:rPr kumimoji="1" lang="zh-CN" altLang="en-US" smtClean="0"/>
-              <a:t>2022/7/28</a:t>
+              <a:t>2022/12/6</a:t>
             </a:fld>
             <a:endParaRPr kumimoji="1" lang="zh-CN" altLang="en-US"/>
           </a:p>
@@ -2642,7 +2643,7 @@
           <a:p>
             <a:fld id="{F22BDC89-9E9E-3E48-98D5-B035B26EE505}" type="datetimeFigureOut">
               <a:rPr kumimoji="1" lang="zh-CN" altLang="en-US" smtClean="0"/>
-              <a:t>2022/7/28</a:t>
+              <a:t>2022/12/6</a:t>
             </a:fld>
             <a:endParaRPr kumimoji="1" lang="zh-CN" altLang="en-US"/>
           </a:p>
@@ -2930,7 +2931,7 @@
           <a:p>
             <a:fld id="{F22BDC89-9E9E-3E48-98D5-B035B26EE505}" type="datetimeFigureOut">
               <a:rPr kumimoji="1" lang="zh-CN" altLang="en-US" smtClean="0"/>
-              <a:t>2022/7/28</a:t>
+              <a:t>2022/12/6</a:t>
             </a:fld>
             <a:endParaRPr kumimoji="1" lang="zh-CN" altLang="en-US"/>
           </a:p>
@@ -3171,7 +3172,7 @@
           <a:p>
             <a:fld id="{F22BDC89-9E9E-3E48-98D5-B035B26EE505}" type="datetimeFigureOut">
               <a:rPr kumimoji="1" lang="zh-CN" altLang="en-US" smtClean="0"/>
-              <a:t>2022/7/28</a:t>
+              <a:t>2022/12/6</a:t>
             </a:fld>
             <a:endParaRPr kumimoji="1" lang="zh-CN" altLang="en-US"/>
           </a:p>
@@ -6253,6 +6254,1095 @@
 </p:sld>
 </file>
 
+<file path=ppt/slides/slide3.xml><?xml version="1.0" encoding="utf-8"?>
+<p:sld xmlns:a="http://schemas.openxmlformats.org/drawingml/2006/main" xmlns:r="http://schemas.openxmlformats.org/officeDocument/2006/relationships" xmlns:p="http://schemas.openxmlformats.org/presentationml/2006/main">
+  <p:cSld>
+    <p:spTree>
+      <p:nvGrpSpPr>
+        <p:cNvPr id="1" name=""/>
+        <p:cNvGrpSpPr/>
+        <p:nvPr/>
+      </p:nvGrpSpPr>
+      <p:grpSpPr>
+        <a:xfrm>
+          <a:off x="0" y="0"/>
+          <a:ext cx="0" cy="0"/>
+          <a:chOff x="0" y="0"/>
+          <a:chExt cx="0" cy="0"/>
+        </a:xfrm>
+      </p:grpSpPr>
+      <p:sp>
+        <p:nvSpPr>
+          <p:cNvPr id="2" name="矩形 1">
+            <a:extLst>
+              <a:ext uri="{FF2B5EF4-FFF2-40B4-BE49-F238E27FC236}">
+                <a16:creationId xmlns:a16="http://schemas.microsoft.com/office/drawing/2014/main" id="{AA9CA3C9-8DB1-F2FD-B846-562EA7B1B327}"/>
+              </a:ext>
+            </a:extLst>
+          </p:cNvPr>
+          <p:cNvSpPr/>
+          <p:nvPr/>
+        </p:nvSpPr>
+        <p:spPr>
+          <a:xfrm>
+            <a:off x="163551" y="171439"/>
+            <a:ext cx="2382087" cy="2713606"/>
+          </a:xfrm>
+          <a:prstGeom prst="rect">
+            <a:avLst/>
+          </a:prstGeom>
+          <a:solidFill>
+            <a:schemeClr val="accent5">
+              <a:alpha val="50000"/>
+            </a:schemeClr>
+          </a:solidFill>
+          <a:ln>
+            <a:noFill/>
+          </a:ln>
+        </p:spPr>
+        <p:style>
+          <a:lnRef idx="0">
+            <a:scrgbClr r="0" g="0" b="0"/>
+          </a:lnRef>
+          <a:fillRef idx="0">
+            <a:scrgbClr r="0" g="0" b="0"/>
+          </a:fillRef>
+          <a:effectRef idx="0">
+            <a:scrgbClr r="0" g="0" b="0"/>
+          </a:effectRef>
+          <a:fontRef idx="minor">
+            <a:schemeClr val="lt1"/>
+          </a:fontRef>
+        </p:style>
+        <p:txBody>
+          <a:bodyPr rtlCol="0" anchor="ctr"/>
+          <a:lstStyle/>
+          <a:p>
+            <a:pPr algn="ctr"/>
+            <a:endParaRPr lang="zh-CN" altLang="en-US"/>
+          </a:p>
+        </p:txBody>
+      </p:sp>
+      <p:pic>
+        <p:nvPicPr>
+          <p:cNvPr id="4" name="图片 3">
+            <a:extLst>
+              <a:ext uri="{FF2B5EF4-FFF2-40B4-BE49-F238E27FC236}">
+                <a16:creationId xmlns:a16="http://schemas.microsoft.com/office/drawing/2014/main" id="{0E5CE6A7-5BBB-17E1-4768-A5F3A7199CCD}"/>
+              </a:ext>
+            </a:extLst>
+          </p:cNvPr>
+          <p:cNvPicPr>
+            <a:picLocks noChangeAspect="1"/>
+          </p:cNvPicPr>
+          <p:nvPr/>
+        </p:nvPicPr>
+        <p:blipFill>
+          <a:blip r:embed="rId2">
+            <a:clrChange>
+              <a:clrFrom>
+                <a:srgbClr val="FFFFFF"/>
+              </a:clrFrom>
+              <a:clrTo>
+                <a:srgbClr val="FFFFFF">
+                  <a:alpha val="0"/>
+                </a:srgbClr>
+              </a:clrTo>
+            </a:clrChange>
+          </a:blip>
+          <a:stretch>
+            <a:fillRect/>
+          </a:stretch>
+        </p:blipFill>
+        <p:spPr>
+          <a:xfrm>
+            <a:off x="131957" y="171439"/>
+            <a:ext cx="2413681" cy="2713606"/>
+          </a:xfrm>
+          <a:prstGeom prst="rect">
+            <a:avLst/>
+          </a:prstGeom>
+        </p:spPr>
+      </p:pic>
+      <p:sp>
+        <p:nvSpPr>
+          <p:cNvPr id="6" name="矩形 5">
+            <a:extLst>
+              <a:ext uri="{FF2B5EF4-FFF2-40B4-BE49-F238E27FC236}">
+                <a16:creationId xmlns:a16="http://schemas.microsoft.com/office/drawing/2014/main" id="{AD707D6C-45E9-0155-0030-0D14C2F0F9DC}"/>
+              </a:ext>
+            </a:extLst>
+          </p:cNvPr>
+          <p:cNvSpPr/>
+          <p:nvPr/>
+        </p:nvSpPr>
+        <p:spPr>
+          <a:xfrm>
+            <a:off x="2684341" y="171439"/>
+            <a:ext cx="2382087" cy="2713606"/>
+          </a:xfrm>
+          <a:prstGeom prst="rect">
+            <a:avLst/>
+          </a:prstGeom>
+          <a:solidFill>
+            <a:schemeClr val="accent5">
+              <a:alpha val="50000"/>
+            </a:schemeClr>
+          </a:solidFill>
+          <a:ln>
+            <a:noFill/>
+          </a:ln>
+        </p:spPr>
+        <p:style>
+          <a:lnRef idx="0">
+            <a:scrgbClr r="0" g="0" b="0"/>
+          </a:lnRef>
+          <a:fillRef idx="0">
+            <a:scrgbClr r="0" g="0" b="0"/>
+          </a:fillRef>
+          <a:effectRef idx="0">
+            <a:scrgbClr r="0" g="0" b="0"/>
+          </a:effectRef>
+          <a:fontRef idx="minor">
+            <a:schemeClr val="lt1"/>
+          </a:fontRef>
+        </p:style>
+        <p:txBody>
+          <a:bodyPr rtlCol="0" anchor="ctr"/>
+          <a:lstStyle/>
+          <a:p>
+            <a:pPr algn="ctr"/>
+            <a:endParaRPr lang="zh-CN" altLang="en-US"/>
+          </a:p>
+        </p:txBody>
+      </p:sp>
+      <p:pic>
+        <p:nvPicPr>
+          <p:cNvPr id="7" name="图片 6">
+            <a:extLst>
+              <a:ext uri="{FF2B5EF4-FFF2-40B4-BE49-F238E27FC236}">
+                <a16:creationId xmlns:a16="http://schemas.microsoft.com/office/drawing/2014/main" id="{D2F8B670-F624-C2BA-BBBD-07916FA5B0A5}"/>
+              </a:ext>
+            </a:extLst>
+          </p:cNvPr>
+          <p:cNvPicPr>
+            <a:picLocks noChangeAspect="1"/>
+          </p:cNvPicPr>
+          <p:nvPr/>
+        </p:nvPicPr>
+        <p:blipFill>
+          <a:blip r:embed="rId2">
+            <a:clrChange>
+              <a:clrFrom>
+                <a:srgbClr val="FFFFFF"/>
+              </a:clrFrom>
+              <a:clrTo>
+                <a:srgbClr val="FFFFFF">
+                  <a:alpha val="0"/>
+                </a:srgbClr>
+              </a:clrTo>
+            </a:clrChange>
+          </a:blip>
+          <a:stretch>
+            <a:fillRect/>
+          </a:stretch>
+        </p:blipFill>
+        <p:spPr>
+          <a:xfrm>
+            <a:off x="2652747" y="171439"/>
+            <a:ext cx="2413681" cy="2713606"/>
+          </a:xfrm>
+          <a:prstGeom prst="rect">
+            <a:avLst/>
+          </a:prstGeom>
+        </p:spPr>
+      </p:pic>
+      <p:sp>
+        <p:nvSpPr>
+          <p:cNvPr id="8" name="矩形 7">
+            <a:extLst>
+              <a:ext uri="{FF2B5EF4-FFF2-40B4-BE49-F238E27FC236}">
+                <a16:creationId xmlns:a16="http://schemas.microsoft.com/office/drawing/2014/main" id="{5DBD5105-93BD-A8EF-FDB5-58FF17735F77}"/>
+              </a:ext>
+            </a:extLst>
+          </p:cNvPr>
+          <p:cNvSpPr/>
+          <p:nvPr/>
+        </p:nvSpPr>
+        <p:spPr>
+          <a:xfrm>
+            <a:off x="5205131" y="171439"/>
+            <a:ext cx="2382087" cy="2713606"/>
+          </a:xfrm>
+          <a:prstGeom prst="rect">
+            <a:avLst/>
+          </a:prstGeom>
+          <a:solidFill>
+            <a:schemeClr val="accent5">
+              <a:alpha val="50000"/>
+            </a:schemeClr>
+          </a:solidFill>
+          <a:ln>
+            <a:noFill/>
+          </a:ln>
+        </p:spPr>
+        <p:style>
+          <a:lnRef idx="0">
+            <a:scrgbClr r="0" g="0" b="0"/>
+          </a:lnRef>
+          <a:fillRef idx="0">
+            <a:scrgbClr r="0" g="0" b="0"/>
+          </a:fillRef>
+          <a:effectRef idx="0">
+            <a:scrgbClr r="0" g="0" b="0"/>
+          </a:effectRef>
+          <a:fontRef idx="minor">
+            <a:schemeClr val="lt1"/>
+          </a:fontRef>
+        </p:style>
+        <p:txBody>
+          <a:bodyPr rtlCol="0" anchor="ctr"/>
+          <a:lstStyle/>
+          <a:p>
+            <a:pPr algn="ctr"/>
+            <a:endParaRPr lang="zh-CN" altLang="en-US"/>
+          </a:p>
+        </p:txBody>
+      </p:sp>
+      <p:pic>
+        <p:nvPicPr>
+          <p:cNvPr id="9" name="图片 8">
+            <a:extLst>
+              <a:ext uri="{FF2B5EF4-FFF2-40B4-BE49-F238E27FC236}">
+                <a16:creationId xmlns:a16="http://schemas.microsoft.com/office/drawing/2014/main" id="{5A53F3ED-B38E-180E-96C0-CA70607D38ED}"/>
+              </a:ext>
+            </a:extLst>
+          </p:cNvPr>
+          <p:cNvPicPr>
+            <a:picLocks noChangeAspect="1"/>
+          </p:cNvPicPr>
+          <p:nvPr/>
+        </p:nvPicPr>
+        <p:blipFill>
+          <a:blip r:embed="rId2">
+            <a:clrChange>
+              <a:clrFrom>
+                <a:srgbClr val="FFFFFF"/>
+              </a:clrFrom>
+              <a:clrTo>
+                <a:srgbClr val="FFFFFF">
+                  <a:alpha val="0"/>
+                </a:srgbClr>
+              </a:clrTo>
+            </a:clrChange>
+          </a:blip>
+          <a:stretch>
+            <a:fillRect/>
+          </a:stretch>
+        </p:blipFill>
+        <p:spPr>
+          <a:xfrm>
+            <a:off x="5173537" y="171439"/>
+            <a:ext cx="2413681" cy="2713606"/>
+          </a:xfrm>
+          <a:prstGeom prst="rect">
+            <a:avLst/>
+          </a:prstGeom>
+        </p:spPr>
+      </p:pic>
+      <p:sp>
+        <p:nvSpPr>
+          <p:cNvPr id="10" name="矩形 9">
+            <a:extLst>
+              <a:ext uri="{FF2B5EF4-FFF2-40B4-BE49-F238E27FC236}">
+                <a16:creationId xmlns:a16="http://schemas.microsoft.com/office/drawing/2014/main" id="{C3EEEDBD-35F1-1205-058D-DB070186CFB6}"/>
+              </a:ext>
+            </a:extLst>
+          </p:cNvPr>
+          <p:cNvSpPr/>
+          <p:nvPr/>
+        </p:nvSpPr>
+        <p:spPr>
+          <a:xfrm>
+            <a:off x="7725921" y="171439"/>
+            <a:ext cx="2382087" cy="2713606"/>
+          </a:xfrm>
+          <a:prstGeom prst="rect">
+            <a:avLst/>
+          </a:prstGeom>
+          <a:solidFill>
+            <a:schemeClr val="accent5">
+              <a:alpha val="50000"/>
+            </a:schemeClr>
+          </a:solidFill>
+          <a:ln>
+            <a:noFill/>
+          </a:ln>
+        </p:spPr>
+        <p:style>
+          <a:lnRef idx="0">
+            <a:scrgbClr r="0" g="0" b="0"/>
+          </a:lnRef>
+          <a:fillRef idx="0">
+            <a:scrgbClr r="0" g="0" b="0"/>
+          </a:fillRef>
+          <a:effectRef idx="0">
+            <a:scrgbClr r="0" g="0" b="0"/>
+          </a:effectRef>
+          <a:fontRef idx="minor">
+            <a:schemeClr val="lt1"/>
+          </a:fontRef>
+        </p:style>
+        <p:txBody>
+          <a:bodyPr rtlCol="0" anchor="ctr"/>
+          <a:lstStyle/>
+          <a:p>
+            <a:pPr algn="ctr"/>
+            <a:endParaRPr lang="zh-CN" altLang="en-US"/>
+          </a:p>
+        </p:txBody>
+      </p:sp>
+      <p:pic>
+        <p:nvPicPr>
+          <p:cNvPr id="11" name="图片 10">
+            <a:extLst>
+              <a:ext uri="{FF2B5EF4-FFF2-40B4-BE49-F238E27FC236}">
+                <a16:creationId xmlns:a16="http://schemas.microsoft.com/office/drawing/2014/main" id="{3D06A507-D503-3C50-108D-56A7CC4DA70E}"/>
+              </a:ext>
+            </a:extLst>
+          </p:cNvPr>
+          <p:cNvPicPr>
+            <a:picLocks noChangeAspect="1"/>
+          </p:cNvPicPr>
+          <p:nvPr/>
+        </p:nvPicPr>
+        <p:blipFill>
+          <a:blip r:embed="rId2">
+            <a:clrChange>
+              <a:clrFrom>
+                <a:srgbClr val="FFFFFF"/>
+              </a:clrFrom>
+              <a:clrTo>
+                <a:srgbClr val="FFFFFF">
+                  <a:alpha val="0"/>
+                </a:srgbClr>
+              </a:clrTo>
+            </a:clrChange>
+          </a:blip>
+          <a:stretch>
+            <a:fillRect/>
+          </a:stretch>
+        </p:blipFill>
+        <p:spPr>
+          <a:xfrm>
+            <a:off x="7694327" y="171439"/>
+            <a:ext cx="2413681" cy="2713606"/>
+          </a:xfrm>
+          <a:prstGeom prst="rect">
+            <a:avLst/>
+          </a:prstGeom>
+        </p:spPr>
+      </p:pic>
+      <p:pic>
+        <p:nvPicPr>
+          <p:cNvPr id="13" name="图片 12">
+            <a:extLst>
+              <a:ext uri="{FF2B5EF4-FFF2-40B4-BE49-F238E27FC236}">
+                <a16:creationId xmlns:a16="http://schemas.microsoft.com/office/drawing/2014/main" id="{6E841ED2-6B09-B853-3C06-2636A4B1C652}"/>
+              </a:ext>
+            </a:extLst>
+          </p:cNvPr>
+          <p:cNvPicPr>
+            <a:picLocks noChangeAspect="1"/>
+          </p:cNvPicPr>
+          <p:nvPr/>
+        </p:nvPicPr>
+        <p:blipFill>
+          <a:blip r:embed="rId3">
+            <a:clrChange>
+              <a:clrFrom>
+                <a:srgbClr val="FFFFFF"/>
+              </a:clrFrom>
+              <a:clrTo>
+                <a:srgbClr val="FFFFFF">
+                  <a:alpha val="0"/>
+                </a:srgbClr>
+              </a:clrTo>
+            </a:clrChange>
+          </a:blip>
+          <a:stretch>
+            <a:fillRect/>
+          </a:stretch>
+        </p:blipFill>
+        <p:spPr>
+          <a:xfrm>
+            <a:off x="525168" y="510318"/>
+            <a:ext cx="1658851" cy="2109280"/>
+          </a:xfrm>
+          <a:prstGeom prst="rect">
+            <a:avLst/>
+          </a:prstGeom>
+        </p:spPr>
+      </p:pic>
+      <p:pic>
+        <p:nvPicPr>
+          <p:cNvPr id="14" name="图片 13">
+            <a:extLst>
+              <a:ext uri="{FF2B5EF4-FFF2-40B4-BE49-F238E27FC236}">
+                <a16:creationId xmlns:a16="http://schemas.microsoft.com/office/drawing/2014/main" id="{41629556-A8AF-2785-737F-9EF225C43F60}"/>
+              </a:ext>
+            </a:extLst>
+          </p:cNvPr>
+          <p:cNvPicPr>
+            <a:picLocks noChangeAspect="1"/>
+          </p:cNvPicPr>
+          <p:nvPr/>
+        </p:nvPicPr>
+        <p:blipFill>
+          <a:blip r:embed="rId3">
+            <a:clrChange>
+              <a:clrFrom>
+                <a:srgbClr val="FFFFFF"/>
+              </a:clrFrom>
+              <a:clrTo>
+                <a:srgbClr val="FFFFFF">
+                  <a:alpha val="0"/>
+                </a:srgbClr>
+              </a:clrTo>
+            </a:clrChange>
+          </a:blip>
+          <a:stretch>
+            <a:fillRect/>
+          </a:stretch>
+        </p:blipFill>
+        <p:spPr>
+          <a:xfrm rot="1248695">
+            <a:off x="3086984" y="549884"/>
+            <a:ext cx="1658851" cy="2109280"/>
+          </a:xfrm>
+          <a:prstGeom prst="rect">
+            <a:avLst/>
+          </a:prstGeom>
+        </p:spPr>
+      </p:pic>
+      <p:sp>
+        <p:nvSpPr>
+          <p:cNvPr id="18" name="矩形 17">
+            <a:extLst>
+              <a:ext uri="{FF2B5EF4-FFF2-40B4-BE49-F238E27FC236}">
+                <a16:creationId xmlns:a16="http://schemas.microsoft.com/office/drawing/2014/main" id="{5F99AC07-EBF2-179A-87E9-9650E31147D6}"/>
+              </a:ext>
+            </a:extLst>
+          </p:cNvPr>
+          <p:cNvSpPr/>
+          <p:nvPr/>
+        </p:nvSpPr>
+        <p:spPr>
+          <a:xfrm rot="1222052">
+            <a:off x="5801967" y="804121"/>
+            <a:ext cx="149469" cy="152400"/>
+          </a:xfrm>
+          <a:prstGeom prst="rect">
+            <a:avLst/>
+          </a:prstGeom>
+          <a:noFill/>
+          <a:ln>
+            <a:solidFill>
+              <a:srgbClr val="FF0000"/>
+            </a:solidFill>
+          </a:ln>
+          <a:effectLst>
+            <a:glow rad="12700">
+              <a:schemeClr val="bg1"/>
+            </a:glow>
+          </a:effectLst>
+        </p:spPr>
+        <p:style>
+          <a:lnRef idx="2">
+            <a:schemeClr val="accent1">
+              <a:shade val="50000"/>
+            </a:schemeClr>
+          </a:lnRef>
+          <a:fillRef idx="1">
+            <a:schemeClr val="accent1"/>
+          </a:fillRef>
+          <a:effectRef idx="0">
+            <a:schemeClr val="accent1"/>
+          </a:effectRef>
+          <a:fontRef idx="minor">
+            <a:schemeClr val="lt1"/>
+          </a:fontRef>
+        </p:style>
+        <p:txBody>
+          <a:bodyPr rtlCol="0" anchor="ctr"/>
+          <a:lstStyle/>
+          <a:p>
+            <a:pPr algn="ctr"/>
+            <a:endParaRPr lang="zh-CN" altLang="en-US"/>
+          </a:p>
+        </p:txBody>
+      </p:sp>
+      <p:sp>
+        <p:nvSpPr>
+          <p:cNvPr id="19" name="矩形 18">
+            <a:extLst>
+              <a:ext uri="{FF2B5EF4-FFF2-40B4-BE49-F238E27FC236}">
+                <a16:creationId xmlns:a16="http://schemas.microsoft.com/office/drawing/2014/main" id="{2647B760-D752-5C54-D8FC-1022CF790E8A}"/>
+              </a:ext>
+            </a:extLst>
+          </p:cNvPr>
+          <p:cNvSpPr/>
+          <p:nvPr/>
+        </p:nvSpPr>
+        <p:spPr>
+          <a:xfrm rot="244090">
+            <a:off x="5995133" y="1354595"/>
+            <a:ext cx="149469" cy="152400"/>
+          </a:xfrm>
+          <a:prstGeom prst="rect">
+            <a:avLst/>
+          </a:prstGeom>
+          <a:noFill/>
+          <a:ln>
+            <a:solidFill>
+              <a:srgbClr val="FF0000"/>
+            </a:solidFill>
+          </a:ln>
+          <a:effectLst>
+            <a:glow rad="12700">
+              <a:schemeClr val="bg1"/>
+            </a:glow>
+          </a:effectLst>
+        </p:spPr>
+        <p:style>
+          <a:lnRef idx="2">
+            <a:schemeClr val="accent1">
+              <a:shade val="50000"/>
+            </a:schemeClr>
+          </a:lnRef>
+          <a:fillRef idx="1">
+            <a:schemeClr val="accent1"/>
+          </a:fillRef>
+          <a:effectRef idx="0">
+            <a:schemeClr val="accent1"/>
+          </a:effectRef>
+          <a:fontRef idx="minor">
+            <a:schemeClr val="lt1"/>
+          </a:fontRef>
+        </p:style>
+        <p:txBody>
+          <a:bodyPr rtlCol="0" anchor="ctr"/>
+          <a:lstStyle/>
+          <a:p>
+            <a:pPr algn="ctr"/>
+            <a:endParaRPr lang="zh-CN" altLang="en-US"/>
+          </a:p>
+        </p:txBody>
+      </p:sp>
+      <p:sp>
+        <p:nvSpPr>
+          <p:cNvPr id="20" name="矩形 19">
+            <a:extLst>
+              <a:ext uri="{FF2B5EF4-FFF2-40B4-BE49-F238E27FC236}">
+                <a16:creationId xmlns:a16="http://schemas.microsoft.com/office/drawing/2014/main" id="{C228B7C6-1F7E-CFBE-B5B1-C2F208570973}"/>
+              </a:ext>
+            </a:extLst>
+          </p:cNvPr>
+          <p:cNvSpPr/>
+          <p:nvPr/>
+        </p:nvSpPr>
+        <p:spPr>
+          <a:xfrm rot="20110718">
+            <a:off x="6678819" y="1589292"/>
+            <a:ext cx="149469" cy="152400"/>
+          </a:xfrm>
+          <a:prstGeom prst="rect">
+            <a:avLst/>
+          </a:prstGeom>
+          <a:noFill/>
+          <a:ln>
+            <a:solidFill>
+              <a:srgbClr val="FF0000"/>
+            </a:solidFill>
+          </a:ln>
+          <a:effectLst>
+            <a:glow rad="12700">
+              <a:schemeClr val="bg1"/>
+            </a:glow>
+          </a:effectLst>
+        </p:spPr>
+        <p:style>
+          <a:lnRef idx="2">
+            <a:schemeClr val="accent1">
+              <a:shade val="50000"/>
+            </a:schemeClr>
+          </a:lnRef>
+          <a:fillRef idx="1">
+            <a:schemeClr val="accent1"/>
+          </a:fillRef>
+          <a:effectRef idx="0">
+            <a:schemeClr val="accent1"/>
+          </a:effectRef>
+          <a:fontRef idx="minor">
+            <a:schemeClr val="lt1"/>
+          </a:fontRef>
+        </p:style>
+        <p:txBody>
+          <a:bodyPr rtlCol="0" anchor="ctr"/>
+          <a:lstStyle/>
+          <a:p>
+            <a:pPr algn="ctr"/>
+            <a:endParaRPr lang="zh-CN" altLang="en-US"/>
+          </a:p>
+        </p:txBody>
+      </p:sp>
+      <p:sp>
+        <p:nvSpPr>
+          <p:cNvPr id="21" name="矩形 20">
+            <a:extLst>
+              <a:ext uri="{FF2B5EF4-FFF2-40B4-BE49-F238E27FC236}">
+                <a16:creationId xmlns:a16="http://schemas.microsoft.com/office/drawing/2014/main" id="{A57D9188-284C-F5F0-ABF8-2671C7370FAA}"/>
+              </a:ext>
+            </a:extLst>
+          </p:cNvPr>
+          <p:cNvSpPr/>
+          <p:nvPr/>
+        </p:nvSpPr>
+        <p:spPr>
+          <a:xfrm rot="1222052">
+            <a:off x="6129824" y="2024928"/>
+            <a:ext cx="149469" cy="152400"/>
+          </a:xfrm>
+          <a:prstGeom prst="rect">
+            <a:avLst/>
+          </a:prstGeom>
+          <a:noFill/>
+          <a:ln>
+            <a:solidFill>
+              <a:srgbClr val="FF0000"/>
+            </a:solidFill>
+          </a:ln>
+          <a:effectLst>
+            <a:glow rad="12700">
+              <a:schemeClr val="bg1"/>
+            </a:glow>
+          </a:effectLst>
+        </p:spPr>
+        <p:style>
+          <a:lnRef idx="2">
+            <a:schemeClr val="accent1">
+              <a:shade val="50000"/>
+            </a:schemeClr>
+          </a:lnRef>
+          <a:fillRef idx="1">
+            <a:schemeClr val="accent1"/>
+          </a:fillRef>
+          <a:effectRef idx="0">
+            <a:schemeClr val="accent1"/>
+          </a:effectRef>
+          <a:fontRef idx="minor">
+            <a:schemeClr val="lt1"/>
+          </a:fontRef>
+        </p:style>
+        <p:txBody>
+          <a:bodyPr rtlCol="0" anchor="ctr"/>
+          <a:lstStyle/>
+          <a:p>
+            <a:pPr algn="ctr"/>
+            <a:endParaRPr lang="zh-CN" altLang="en-US"/>
+          </a:p>
+        </p:txBody>
+      </p:sp>
+      <p:sp>
+        <p:nvSpPr>
+          <p:cNvPr id="30" name="任意多边形: 形状 29">
+            <a:extLst>
+              <a:ext uri="{FF2B5EF4-FFF2-40B4-BE49-F238E27FC236}">
+                <a16:creationId xmlns:a16="http://schemas.microsoft.com/office/drawing/2014/main" id="{5EAED8BB-3676-B3B2-5D2C-0BEE4D58ABFD}"/>
+              </a:ext>
+            </a:extLst>
+          </p:cNvPr>
+          <p:cNvSpPr/>
+          <p:nvPr/>
+        </p:nvSpPr>
+        <p:spPr>
+          <a:xfrm>
+            <a:off x="8606713" y="948214"/>
+            <a:ext cx="379896" cy="1233487"/>
+          </a:xfrm>
+          <a:custGeom>
+            <a:avLst/>
+            <a:gdLst>
+              <a:gd name="connsiteX0" fmla="*/ 105650 w 379896"/>
+              <a:gd name="connsiteY0" fmla="*/ 602324 h 1233487"/>
+              <a:gd name="connsiteX1" fmla="*/ 198193 w 379896"/>
+              <a:gd name="connsiteY1" fmla="*/ 946056 h 1233487"/>
+              <a:gd name="connsiteX2" fmla="*/ 282921 w 379896"/>
+              <a:gd name="connsiteY2" fmla="*/ 803275 h 1233487"/>
+              <a:gd name="connsiteX3" fmla="*/ 378171 w 379896"/>
+              <a:gd name="connsiteY3" fmla="*/ 966787 h 1233487"/>
+              <a:gd name="connsiteX4" fmla="*/ 351183 w 379896"/>
+              <a:gd name="connsiteY4" fmla="*/ 1233487 h 1233487"/>
+              <a:gd name="connsiteX5" fmla="*/ 197543 w 379896"/>
+              <a:gd name="connsiteY5" fmla="*/ 948381 h 1233487"/>
+              <a:gd name="connsiteX6" fmla="*/ 118902 w 379896"/>
+              <a:gd name="connsiteY6" fmla="*/ 1083819 h 1233487"/>
+              <a:gd name="connsiteX7" fmla="*/ 26137 w 379896"/>
+              <a:gd name="connsiteY7" fmla="*/ 986637 h 1233487"/>
+              <a:gd name="connsiteX8" fmla="*/ 8467 w 379896"/>
+              <a:gd name="connsiteY8" fmla="*/ 730428 h 1233487"/>
+              <a:gd name="connsiteX9" fmla="*/ 269461 w 379896"/>
+              <a:gd name="connsiteY9" fmla="*/ 319015 h 1233487"/>
+              <a:gd name="connsiteX10" fmla="*/ 362226 w 379896"/>
+              <a:gd name="connsiteY10" fmla="*/ 416197 h 1233487"/>
+              <a:gd name="connsiteX11" fmla="*/ 379896 w 379896"/>
+              <a:gd name="connsiteY11" fmla="*/ 672406 h 1233487"/>
+              <a:gd name="connsiteX12" fmla="*/ 282713 w 379896"/>
+              <a:gd name="connsiteY12" fmla="*/ 800510 h 1233487"/>
+              <a:gd name="connsiteX13" fmla="*/ 189948 w 379896"/>
+              <a:gd name="connsiteY13" fmla="*/ 455954 h 1233487"/>
+              <a:gd name="connsiteX14" fmla="*/ 97183 w 379896"/>
+              <a:gd name="connsiteY14" fmla="*/ 112022 h 1233487"/>
+              <a:gd name="connsiteX15" fmla="*/ 189948 w 379896"/>
+              <a:gd name="connsiteY15" fmla="*/ 456578 h 1233487"/>
+              <a:gd name="connsiteX16" fmla="*/ 110435 w 379896"/>
+              <a:gd name="connsiteY16" fmla="*/ 593517 h 1233487"/>
+              <a:gd name="connsiteX17" fmla="*/ 17670 w 379896"/>
+              <a:gd name="connsiteY17" fmla="*/ 496335 h 1233487"/>
+              <a:gd name="connsiteX18" fmla="*/ 0 w 379896"/>
+              <a:gd name="connsiteY18" fmla="*/ 240126 h 1233487"/>
+              <a:gd name="connsiteX19" fmla="*/ 232121 w 379896"/>
+              <a:gd name="connsiteY19" fmla="*/ 0 h 1233487"/>
+              <a:gd name="connsiteX20" fmla="*/ 268633 w 379896"/>
+              <a:gd name="connsiteY20" fmla="*/ 311150 h 1233487"/>
+              <a:gd name="connsiteX21" fmla="*/ 98771 w 379896"/>
+              <a:gd name="connsiteY21" fmla="*/ 100012 h 1233487"/>
+            </a:gdLst>
+            <a:ahLst/>
+            <a:cxnLst>
+              <a:cxn ang="0">
+                <a:pos x="connsiteX0" y="connsiteY0"/>
+              </a:cxn>
+              <a:cxn ang="0">
+                <a:pos x="connsiteX1" y="connsiteY1"/>
+              </a:cxn>
+              <a:cxn ang="0">
+                <a:pos x="connsiteX2" y="connsiteY2"/>
+              </a:cxn>
+              <a:cxn ang="0">
+                <a:pos x="connsiteX3" y="connsiteY3"/>
+              </a:cxn>
+              <a:cxn ang="0">
+                <a:pos x="connsiteX4" y="connsiteY4"/>
+              </a:cxn>
+              <a:cxn ang="0">
+                <a:pos x="connsiteX5" y="connsiteY5"/>
+              </a:cxn>
+              <a:cxn ang="0">
+                <a:pos x="connsiteX6" y="connsiteY6"/>
+              </a:cxn>
+              <a:cxn ang="0">
+                <a:pos x="connsiteX7" y="connsiteY7"/>
+              </a:cxn>
+              <a:cxn ang="0">
+                <a:pos x="connsiteX8" y="connsiteY8"/>
+              </a:cxn>
+              <a:cxn ang="0">
+                <a:pos x="connsiteX9" y="connsiteY9"/>
+              </a:cxn>
+              <a:cxn ang="0">
+                <a:pos x="connsiteX10" y="connsiteY10"/>
+              </a:cxn>
+              <a:cxn ang="0">
+                <a:pos x="connsiteX11" y="connsiteY11"/>
+              </a:cxn>
+              <a:cxn ang="0">
+                <a:pos x="connsiteX12" y="connsiteY12"/>
+              </a:cxn>
+              <a:cxn ang="0">
+                <a:pos x="connsiteX13" y="connsiteY13"/>
+              </a:cxn>
+              <a:cxn ang="0">
+                <a:pos x="connsiteX14" y="connsiteY14"/>
+              </a:cxn>
+              <a:cxn ang="0">
+                <a:pos x="connsiteX15" y="connsiteY15"/>
+              </a:cxn>
+              <a:cxn ang="0">
+                <a:pos x="connsiteX16" y="connsiteY16"/>
+              </a:cxn>
+              <a:cxn ang="0">
+                <a:pos x="connsiteX17" y="connsiteY17"/>
+              </a:cxn>
+              <a:cxn ang="0">
+                <a:pos x="connsiteX18" y="connsiteY18"/>
+              </a:cxn>
+              <a:cxn ang="0">
+                <a:pos x="connsiteX19" y="connsiteY19"/>
+              </a:cxn>
+              <a:cxn ang="0">
+                <a:pos x="connsiteX20" y="connsiteY20"/>
+              </a:cxn>
+              <a:cxn ang="0">
+                <a:pos x="connsiteX21" y="connsiteY21"/>
+              </a:cxn>
+            </a:cxnLst>
+            <a:rect l="l" t="t" r="r" b="b"/>
+            <a:pathLst>
+              <a:path w="379896" h="1233487">
+                <a:moveTo>
+                  <a:pt x="105650" y="602324"/>
+                </a:moveTo>
+                <a:lnTo>
+                  <a:pt x="198193" y="946056"/>
+                </a:lnTo>
+                <a:lnTo>
+                  <a:pt x="282921" y="803275"/>
+                </a:lnTo>
+                <a:lnTo>
+                  <a:pt x="378171" y="966787"/>
+                </a:lnTo>
+                <a:lnTo>
+                  <a:pt x="351183" y="1233487"/>
+                </a:lnTo>
+                <a:lnTo>
+                  <a:pt x="197543" y="948381"/>
+                </a:lnTo>
+                <a:lnTo>
+                  <a:pt x="118902" y="1083819"/>
+                </a:lnTo>
+                <a:lnTo>
+                  <a:pt x="26137" y="986637"/>
+                </a:lnTo>
+                <a:lnTo>
+                  <a:pt x="8467" y="730428"/>
+                </a:lnTo>
+                <a:close/>
+                <a:moveTo>
+                  <a:pt x="269461" y="319015"/>
+                </a:moveTo>
+                <a:lnTo>
+                  <a:pt x="362226" y="416197"/>
+                </a:lnTo>
+                <a:lnTo>
+                  <a:pt x="379896" y="672406"/>
+                </a:lnTo>
+                <a:lnTo>
+                  <a:pt x="282713" y="800510"/>
+                </a:lnTo>
+                <a:lnTo>
+                  <a:pt x="189948" y="455954"/>
+                </a:lnTo>
+                <a:close/>
+                <a:moveTo>
+                  <a:pt x="97183" y="112022"/>
+                </a:moveTo>
+                <a:lnTo>
+                  <a:pt x="189948" y="456578"/>
+                </a:lnTo>
+                <a:lnTo>
+                  <a:pt x="110435" y="593517"/>
+                </a:lnTo>
+                <a:lnTo>
+                  <a:pt x="17670" y="496335"/>
+                </a:lnTo>
+                <a:lnTo>
+                  <a:pt x="0" y="240126"/>
+                </a:lnTo>
+                <a:close/>
+                <a:moveTo>
+                  <a:pt x="232121" y="0"/>
+                </a:moveTo>
+                <a:lnTo>
+                  <a:pt x="268633" y="311150"/>
+                </a:lnTo>
+                <a:lnTo>
+                  <a:pt x="98771" y="100012"/>
+                </a:lnTo>
+                <a:close/>
+              </a:path>
+            </a:pathLst>
+          </a:custGeom>
+          <a:noFill/>
+          <a:ln>
+            <a:solidFill>
+              <a:srgbClr val="FF0000"/>
+            </a:solidFill>
+          </a:ln>
+          <a:effectLst>
+            <a:glow rad="12700">
+              <a:schemeClr val="bg1"/>
+            </a:glow>
+          </a:effectLst>
+        </p:spPr>
+        <p:style>
+          <a:lnRef idx="2">
+            <a:schemeClr val="accent1">
+              <a:shade val="50000"/>
+            </a:schemeClr>
+          </a:lnRef>
+          <a:fillRef idx="1">
+            <a:schemeClr val="accent1"/>
+          </a:fillRef>
+          <a:effectRef idx="0">
+            <a:schemeClr val="accent1"/>
+          </a:effectRef>
+          <a:fontRef idx="minor">
+            <a:schemeClr val="lt1"/>
+          </a:fontRef>
+        </p:style>
+        <p:txBody>
+          <a:bodyPr wrap="square" rtlCol="0" anchor="ctr">
+            <a:noAutofit/>
+          </a:bodyPr>
+          <a:lstStyle/>
+          <a:p>
+            <a:pPr algn="ctr"/>
+            <a:endParaRPr lang="zh-CN" altLang="en-US"/>
+          </a:p>
+        </p:txBody>
+      </p:sp>
+      <p:sp>
+        <p:nvSpPr>
+          <p:cNvPr id="31" name="任意多边形: 形状 30">
+            <a:extLst>
+              <a:ext uri="{FF2B5EF4-FFF2-40B4-BE49-F238E27FC236}">
+                <a16:creationId xmlns:a16="http://schemas.microsoft.com/office/drawing/2014/main" id="{D845A2F8-B867-F04D-D713-EA99BF92D594}"/>
+              </a:ext>
+            </a:extLst>
+          </p:cNvPr>
+          <p:cNvSpPr/>
+          <p:nvPr/>
+        </p:nvSpPr>
+        <p:spPr>
+          <a:xfrm>
+            <a:off x="9150626" y="1349485"/>
+            <a:ext cx="234122" cy="521252"/>
+          </a:xfrm>
+          <a:custGeom>
+            <a:avLst/>
+            <a:gdLst>
+              <a:gd name="connsiteX0" fmla="*/ 97183 w 234122"/>
+              <a:gd name="connsiteY0" fmla="*/ 0 h 521252"/>
+              <a:gd name="connsiteX1" fmla="*/ 0 w 234122"/>
+              <a:gd name="connsiteY1" fmla="*/ 159026 h 521252"/>
+              <a:gd name="connsiteX2" fmla="*/ 4417 w 234122"/>
+              <a:gd name="connsiteY2" fmla="*/ 397565 h 521252"/>
+              <a:gd name="connsiteX3" fmla="*/ 97183 w 234122"/>
+              <a:gd name="connsiteY3" fmla="*/ 521252 h 521252"/>
+              <a:gd name="connsiteX4" fmla="*/ 234122 w 234122"/>
+              <a:gd name="connsiteY4" fmla="*/ 384313 h 521252"/>
+              <a:gd name="connsiteX5" fmla="*/ 212035 w 234122"/>
+              <a:gd name="connsiteY5" fmla="*/ 198783 h 521252"/>
+              <a:gd name="connsiteX6" fmla="*/ 97183 w 234122"/>
+              <a:gd name="connsiteY6" fmla="*/ 0 h 521252"/>
+            </a:gdLst>
+            <a:ahLst/>
+            <a:cxnLst>
+              <a:cxn ang="0">
+                <a:pos x="connsiteX0" y="connsiteY0"/>
+              </a:cxn>
+              <a:cxn ang="0">
+                <a:pos x="connsiteX1" y="connsiteY1"/>
+              </a:cxn>
+              <a:cxn ang="0">
+                <a:pos x="connsiteX2" y="connsiteY2"/>
+              </a:cxn>
+              <a:cxn ang="0">
+                <a:pos x="connsiteX3" y="connsiteY3"/>
+              </a:cxn>
+              <a:cxn ang="0">
+                <a:pos x="connsiteX4" y="connsiteY4"/>
+              </a:cxn>
+              <a:cxn ang="0">
+                <a:pos x="connsiteX5" y="connsiteY5"/>
+              </a:cxn>
+              <a:cxn ang="0">
+                <a:pos x="connsiteX6" y="connsiteY6"/>
+              </a:cxn>
+            </a:cxnLst>
+            <a:rect l="l" t="t" r="r" b="b"/>
+            <a:pathLst>
+              <a:path w="234122" h="521252">
+                <a:moveTo>
+                  <a:pt x="97183" y="0"/>
+                </a:moveTo>
+                <a:lnTo>
+                  <a:pt x="0" y="159026"/>
+                </a:lnTo>
+                <a:cubicBezTo>
+                  <a:pt x="1472" y="238539"/>
+                  <a:pt x="2945" y="318052"/>
+                  <a:pt x="4417" y="397565"/>
+                </a:cubicBezTo>
+                <a:lnTo>
+                  <a:pt x="97183" y="521252"/>
+                </a:lnTo>
+                <a:lnTo>
+                  <a:pt x="234122" y="384313"/>
+                </a:lnTo>
+                <a:lnTo>
+                  <a:pt x="212035" y="198783"/>
+                </a:lnTo>
+                <a:lnTo>
+                  <a:pt x="97183" y="0"/>
+                </a:lnTo>
+                <a:close/>
+              </a:path>
+            </a:pathLst>
+          </a:custGeom>
+          <a:noFill/>
+          <a:ln>
+            <a:solidFill>
+              <a:srgbClr val="FF0000"/>
+            </a:solidFill>
+          </a:ln>
+          <a:effectLst>
+            <a:glow rad="12700">
+              <a:schemeClr val="bg1"/>
+            </a:glow>
+          </a:effectLst>
+        </p:spPr>
+        <p:style>
+          <a:lnRef idx="2">
+            <a:schemeClr val="accent1">
+              <a:shade val="50000"/>
+            </a:schemeClr>
+          </a:lnRef>
+          <a:fillRef idx="1">
+            <a:schemeClr val="accent1"/>
+          </a:fillRef>
+          <a:effectRef idx="0">
+            <a:schemeClr val="accent1"/>
+          </a:effectRef>
+          <a:fontRef idx="minor">
+            <a:schemeClr val="lt1"/>
+          </a:fontRef>
+        </p:style>
+        <p:txBody>
+          <a:bodyPr wrap="square" rtlCol="0" anchor="ctr">
+            <a:noAutofit/>
+          </a:bodyPr>
+          <a:lstStyle/>
+          <a:p>
+            <a:pPr algn="ctr"/>
+            <a:endParaRPr lang="zh-CN" altLang="en-US"/>
+          </a:p>
+        </p:txBody>
+      </p:sp>
+    </p:spTree>
+    <p:extLst>
+      <p:ext uri="{BB962C8B-B14F-4D97-AF65-F5344CB8AC3E}">
+        <p14:creationId xmlns:p14="http://schemas.microsoft.com/office/powerpoint/2010/main" val="473088845"/>
+      </p:ext>
+    </p:extLst>
+  </p:cSld>
+  <p:clrMapOvr>
+    <a:masterClrMapping/>
+  </p:clrMapOvr>
+</p:sld>
+</file>
+
 <file path=ppt/theme/theme1.xml><?xml version="1.0" encoding="utf-8"?>
 <a:theme xmlns:a="http://schemas.openxmlformats.org/drawingml/2006/main" name="Office 主题​​">
   <a:themeElements>

</xml_diff>